<commit_message>
Observer pattern: remove italics in diagrams
</commit_message>
<xml_diff>
--- a/diagrams/designPatterns/observer/whatItIs/observableInterfaceDiagram.pptx
+++ b/diagrams/designPatterns/observer/whatItIs/observableInterfaceDiagram.pptx
@@ -107,6 +107,22 @@
       </a:defRPr>
     </a:lvl9pPr>
   </p:defaultTextStyle>
+  <p:extLst>
+    <p:ext uri="{EFAFB233-063F-42B5-8137-9DF3F51BA10A}">
+      <p15:sldGuideLst xmlns:p15="http://schemas.microsoft.com/office/powerpoint/2012/main">
+        <p15:guide id="1" orient="horz" pos="2160">
+          <p15:clr>
+            <a:srgbClr val="A4A3A4"/>
+          </p15:clr>
+        </p15:guide>
+        <p15:guide id="2" pos="2880">
+          <p15:clr>
+            <a:srgbClr val="A4A3A4"/>
+          </p15:clr>
+        </p15:guide>
+      </p15:sldGuideLst>
+    </p:ext>
+  </p:extLst>
 </p:presentation>
 </file>
 
@@ -192,7 +208,7 @@
           <a:p>
             <a:fld id="{66906C45-2DB0-4797-8F62-CAF8E935D413}" type="datetimeFigureOut">
               <a:rPr lang="en-SG" smtClean="0"/>
-              <a:t>23/6/2017</a:t>
+              <a:t>28/10/2020</a:t>
             </a:fld>
             <a:endParaRPr lang="en-SG"/>
           </a:p>
@@ -725,7 +741,7 @@
           <a:p>
             <a:fld id="{8486F480-15A6-4026-BC99-052F8E994139}" type="datetimeFigureOut">
               <a:rPr lang="en-SG" smtClean="0"/>
-              <a:t>23/6/2017</a:t>
+              <a:t>28/10/2020</a:t>
             </a:fld>
             <a:endParaRPr lang="en-SG"/>
           </a:p>
@@ -895,7 +911,7 @@
           <a:p>
             <a:fld id="{8486F480-15A6-4026-BC99-052F8E994139}" type="datetimeFigureOut">
               <a:rPr lang="en-SG" smtClean="0"/>
-              <a:t>23/6/2017</a:t>
+              <a:t>28/10/2020</a:t>
             </a:fld>
             <a:endParaRPr lang="en-SG"/>
           </a:p>
@@ -1075,7 +1091,7 @@
           <a:p>
             <a:fld id="{8486F480-15A6-4026-BC99-052F8E994139}" type="datetimeFigureOut">
               <a:rPr lang="en-SG" smtClean="0"/>
-              <a:t>23/6/2017</a:t>
+              <a:t>28/10/2020</a:t>
             </a:fld>
             <a:endParaRPr lang="en-SG"/>
           </a:p>
@@ -1245,7 +1261,7 @@
           <a:p>
             <a:fld id="{8486F480-15A6-4026-BC99-052F8E994139}" type="datetimeFigureOut">
               <a:rPr lang="en-SG" smtClean="0"/>
-              <a:t>23/6/2017</a:t>
+              <a:t>28/10/2020</a:t>
             </a:fld>
             <a:endParaRPr lang="en-SG"/>
           </a:p>
@@ -1491,7 +1507,7 @@
           <a:p>
             <a:fld id="{8486F480-15A6-4026-BC99-052F8E994139}" type="datetimeFigureOut">
               <a:rPr lang="en-SG" smtClean="0"/>
-              <a:t>23/6/2017</a:t>
+              <a:t>28/10/2020</a:t>
             </a:fld>
             <a:endParaRPr lang="en-SG"/>
           </a:p>
@@ -1779,7 +1795,7 @@
           <a:p>
             <a:fld id="{8486F480-15A6-4026-BC99-052F8E994139}" type="datetimeFigureOut">
               <a:rPr lang="en-SG" smtClean="0"/>
-              <a:t>23/6/2017</a:t>
+              <a:t>28/10/2020</a:t>
             </a:fld>
             <a:endParaRPr lang="en-SG"/>
           </a:p>
@@ -2201,7 +2217,7 @@
           <a:p>
             <a:fld id="{8486F480-15A6-4026-BC99-052F8E994139}" type="datetimeFigureOut">
               <a:rPr lang="en-SG" smtClean="0"/>
-              <a:t>23/6/2017</a:t>
+              <a:t>28/10/2020</a:t>
             </a:fld>
             <a:endParaRPr lang="en-SG"/>
           </a:p>
@@ -2319,7 +2335,7 @@
           <a:p>
             <a:fld id="{8486F480-15A6-4026-BC99-052F8E994139}" type="datetimeFigureOut">
               <a:rPr lang="en-SG" smtClean="0"/>
-              <a:t>23/6/2017</a:t>
+              <a:t>28/10/2020</a:t>
             </a:fld>
             <a:endParaRPr lang="en-SG"/>
           </a:p>
@@ -2414,7 +2430,7 @@
           <a:p>
             <a:fld id="{8486F480-15A6-4026-BC99-052F8E994139}" type="datetimeFigureOut">
               <a:rPr lang="en-SG" smtClean="0"/>
-              <a:t>23/6/2017</a:t>
+              <a:t>28/10/2020</a:t>
             </a:fld>
             <a:endParaRPr lang="en-SG"/>
           </a:p>
@@ -2691,7 +2707,7 @@
           <a:p>
             <a:fld id="{8486F480-15A6-4026-BC99-052F8E994139}" type="datetimeFigureOut">
               <a:rPr lang="en-SG" smtClean="0"/>
-              <a:t>23/6/2017</a:t>
+              <a:t>28/10/2020</a:t>
             </a:fld>
             <a:endParaRPr lang="en-SG"/>
           </a:p>
@@ -2944,7 +2960,7 @@
           <a:p>
             <a:fld id="{8486F480-15A6-4026-BC99-052F8E994139}" type="datetimeFigureOut">
               <a:rPr lang="en-SG" smtClean="0"/>
-              <a:t>23/6/2017</a:t>
+              <a:t>28/10/2020</a:t>
             </a:fld>
             <a:endParaRPr lang="en-SG"/>
           </a:p>
@@ -3157,7 +3173,7 @@
           <a:p>
             <a:fld id="{8486F480-15A6-4026-BC99-052F8E994139}" type="datetimeFigureOut">
               <a:rPr lang="en-SG" smtClean="0"/>
-              <a:t>23/6/2017</a:t>
+              <a:t>28/10/2020</a:t>
             </a:fld>
             <a:endParaRPr lang="en-SG"/>
           </a:p>
@@ -3740,7 +3756,7 @@
           <a:lstStyle/>
           <a:p>
             <a:r>
-              <a:rPr lang="en-US" sz="2000" b="0" i="1">
+              <a:rPr lang="en-US" sz="2000" b="0" dirty="0">
                 <a:solidFill>
                   <a:schemeClr val="tx1"/>
                 </a:solidFill>

</xml_diff>